<commit_message>
ppt : finally fin
</commit_message>
<xml_diff>
--- a/ROP_FSB.pptx
+++ b/ROP_FSB.pptx
@@ -5197,7 +5197,15 @@
             </a:pPr>
             <a:r>
               <a:rPr lang="ko-KR" altLang="en-US" dirty="0"/>
-              <a:t>아래와 같이 다양한 지정 서식자가 존재함</a:t>
+              <a:t>아래와 같이 </a:t>
+            </a:r>
+            <a:r>
+              <a:rPr lang="ko-KR" altLang="en-US"/>
+              <a:t>다양한 서식 지정자가 </a:t>
+            </a:r>
+            <a:r>
+              <a:rPr lang="ko-KR" altLang="en-US" dirty="0"/>
+              <a:t>존재함</a:t>
             </a:r>
             <a:r>
               <a:rPr lang="en-US" altLang="ko-KR" dirty="0"/>

</xml_diff>